<commit_message>
Arduino_code + minor revision on documentation
</commit_message>
<xml_diff>
--- a/documentation/boitier/connecteurs_schema.pptx
+++ b/documentation/boitier/connecteurs_schema.pptx
@@ -4212,769 +4212,872 @@
           <a:chExt cx="0" cy="0"/>
         </a:xfrm>
       </p:grpSpPr>
-      <p:sp>
-        <p:nvSpPr>
-          <p:cNvPr id="4" name="Ellipse 3">
-            <a:extLst>
-              <a:ext uri="{FF2B5EF4-FFF2-40B4-BE49-F238E27FC236}">
-                <a16:creationId xmlns:a16="http://schemas.microsoft.com/office/drawing/2014/main" id="{7042F87D-C157-3BF2-5DAE-864035030B25}"/>
-              </a:ext>
-            </a:extLst>
-          </p:cNvPr>
-          <p:cNvSpPr/>
+      <p:grpSp>
+        <p:nvGrpSpPr>
+          <p:cNvPr id="21" name="Groupe 20">
+            <a:extLst>
+              <a:ext uri="{FF2B5EF4-FFF2-40B4-BE49-F238E27FC236}">
+                <a16:creationId xmlns:a16="http://schemas.microsoft.com/office/drawing/2014/main" id="{2DAF7D8F-60AD-51F6-68DE-9C33047B801A}"/>
+              </a:ext>
+            </a:extLst>
+          </p:cNvPr>
+          <p:cNvGrpSpPr/>
           <p:nvPr/>
-        </p:nvSpPr>
-        <p:spPr>
+        </p:nvGrpSpPr>
+        <p:grpSpPr>
           <a:xfrm>
-            <a:off x="4116000" y="1449000"/>
-            <a:ext cx="3960000" cy="3960000"/>
+            <a:off x="857250" y="647700"/>
+            <a:ext cx="10801350" cy="4761300"/>
+            <a:chOff x="857250" y="647700"/>
+            <a:chExt cx="10801350" cy="4761300"/>
           </a:xfrm>
-          <a:prstGeom prst="ellipse">
-            <a:avLst/>
-          </a:prstGeom>
-          <a:noFill/>
-          <a:ln w="76200"/>
-        </p:spPr>
-        <p:style>
-          <a:lnRef idx="2">
-            <a:schemeClr val="accent1">
-              <a:shade val="15000"/>
-            </a:schemeClr>
-          </a:lnRef>
-          <a:fillRef idx="1">
-            <a:schemeClr val="accent1"/>
-          </a:fillRef>
-          <a:effectRef idx="0">
-            <a:schemeClr val="accent1"/>
-          </a:effectRef>
-          <a:fontRef idx="minor">
-            <a:schemeClr val="lt1"/>
-          </a:fontRef>
-        </p:style>
-        <p:txBody>
-          <a:bodyPr rtlCol="0" anchor="ctr"/>
-          <a:lstStyle/>
-          <a:p>
-            <a:pPr algn="ctr"/>
-            <a:endParaRPr lang="fr-FR"/>
-          </a:p>
-        </p:txBody>
-      </p:sp>
-      <p:sp>
-        <p:nvSpPr>
-          <p:cNvPr id="5" name="Arc partiel 4">
-            <a:extLst>
-              <a:ext uri="{FF2B5EF4-FFF2-40B4-BE49-F238E27FC236}">
-                <a16:creationId xmlns:a16="http://schemas.microsoft.com/office/drawing/2014/main" id="{5787D573-12AF-22EE-575A-808DB9D87A08}"/>
-              </a:ext>
-            </a:extLst>
-          </p:cNvPr>
-          <p:cNvSpPr/>
-          <p:nvPr/>
-        </p:nvSpPr>
-        <p:spPr>
-          <a:xfrm>
-            <a:off x="5423888" y="834637"/>
-            <a:ext cx="1419225" cy="1228725"/>
-          </a:xfrm>
-          <a:prstGeom prst="pie">
-            <a:avLst>
-              <a:gd name="adj1" fmla="val 704342"/>
-              <a:gd name="adj2" fmla="val 10123959"/>
-            </a:avLst>
-          </a:prstGeom>
-          <a:solidFill>
-            <a:schemeClr val="bg1"/>
-          </a:solidFill>
-          <a:ln w="76200">
+        </p:grpSpPr>
+        <p:sp>
+          <p:nvSpPr>
+            <p:cNvPr id="4" name="Ellipse 3">
+              <a:extLst>
+                <a:ext uri="{FF2B5EF4-FFF2-40B4-BE49-F238E27FC236}">
+                  <a16:creationId xmlns:a16="http://schemas.microsoft.com/office/drawing/2014/main" id="{7042F87D-C157-3BF2-5DAE-864035030B25}"/>
+                </a:ext>
+              </a:extLst>
+            </p:cNvPr>
+            <p:cNvSpPr/>
+            <p:nvPr/>
+          </p:nvSpPr>
+          <p:spPr>
+            <a:xfrm>
+              <a:off x="4116000" y="1449000"/>
+              <a:ext cx="3960000" cy="3960000"/>
+            </a:xfrm>
+            <a:prstGeom prst="ellipse">
+              <a:avLst/>
+            </a:prstGeom>
+            <a:noFill/>
+            <a:ln w="76200"/>
+          </p:spPr>
+          <p:style>
+            <a:lnRef idx="2">
+              <a:schemeClr val="accent1">
+                <a:shade val="15000"/>
+              </a:schemeClr>
+            </a:lnRef>
+            <a:fillRef idx="1">
+              <a:schemeClr val="accent1"/>
+            </a:fillRef>
+            <a:effectRef idx="0">
+              <a:schemeClr val="accent1"/>
+            </a:effectRef>
+            <a:fontRef idx="minor">
+              <a:schemeClr val="lt1"/>
+            </a:fontRef>
+          </p:style>
+          <p:txBody>
+            <a:bodyPr rtlCol="0" anchor="ctr"/>
+            <a:lstStyle/>
+            <a:p>
+              <a:pPr algn="ctr"/>
+              <a:endParaRPr lang="fr-FR"/>
+            </a:p>
+          </p:txBody>
+        </p:sp>
+        <p:sp>
+          <p:nvSpPr>
+            <p:cNvPr id="5" name="Arc partiel 4">
+              <a:extLst>
+                <a:ext uri="{FF2B5EF4-FFF2-40B4-BE49-F238E27FC236}">
+                  <a16:creationId xmlns:a16="http://schemas.microsoft.com/office/drawing/2014/main" id="{5787D573-12AF-22EE-575A-808DB9D87A08}"/>
+                </a:ext>
+              </a:extLst>
+            </p:cNvPr>
+            <p:cNvSpPr/>
+            <p:nvPr/>
+          </p:nvSpPr>
+          <p:spPr>
+            <a:xfrm>
+              <a:off x="5423888" y="834637"/>
+              <a:ext cx="1419225" cy="1228725"/>
+            </a:xfrm>
+            <a:prstGeom prst="pie">
+              <a:avLst>
+                <a:gd name="adj1" fmla="val 704342"/>
+                <a:gd name="adj2" fmla="val 10123959"/>
+              </a:avLst>
+            </a:prstGeom>
             <a:solidFill>
-              <a:schemeClr val="tx1"/>
+              <a:schemeClr val="bg1"/>
             </a:solidFill>
-          </a:ln>
-        </p:spPr>
-        <p:style>
-          <a:lnRef idx="2">
-            <a:schemeClr val="accent1">
-              <a:shade val="15000"/>
-            </a:schemeClr>
-          </a:lnRef>
-          <a:fillRef idx="1">
-            <a:schemeClr val="accent1"/>
-          </a:fillRef>
-          <a:effectRef idx="0">
-            <a:schemeClr val="accent1"/>
-          </a:effectRef>
-          <a:fontRef idx="minor">
-            <a:schemeClr val="lt1"/>
-          </a:fontRef>
-        </p:style>
-        <p:txBody>
-          <a:bodyPr rtlCol="0" anchor="ctr"/>
-          <a:lstStyle/>
-          <a:p>
-            <a:pPr algn="ctr"/>
-            <a:endParaRPr lang="fr-FR">
+            <a:ln w="76200">
               <a:solidFill>
                 <a:schemeClr val="tx1"/>
               </a:solidFill>
-            </a:endParaRPr>
-          </a:p>
-        </p:txBody>
-      </p:sp>
-      <p:sp>
-        <p:nvSpPr>
-          <p:cNvPr id="6" name="Ellipse 5">
-            <a:extLst>
-              <a:ext uri="{FF2B5EF4-FFF2-40B4-BE49-F238E27FC236}">
-                <a16:creationId xmlns:a16="http://schemas.microsoft.com/office/drawing/2014/main" id="{D5962C56-D3D6-7875-3EBD-79F29093980A}"/>
-              </a:ext>
-            </a:extLst>
-          </p:cNvPr>
-          <p:cNvSpPr/>
-          <p:nvPr/>
-        </p:nvSpPr>
-        <p:spPr>
-          <a:xfrm>
-            <a:off x="5457825" y="971550"/>
-            <a:ext cx="1360800" cy="1008000"/>
-          </a:xfrm>
-          <a:prstGeom prst="ellipse">
-            <a:avLst/>
-          </a:prstGeom>
-          <a:solidFill>
-            <a:schemeClr val="bg1"/>
-          </a:solidFill>
-          <a:ln>
+            </a:ln>
+          </p:spPr>
+          <p:style>
+            <a:lnRef idx="2">
+              <a:schemeClr val="accent1">
+                <a:shade val="15000"/>
+              </a:schemeClr>
+            </a:lnRef>
+            <a:fillRef idx="1">
+              <a:schemeClr val="accent1"/>
+            </a:fillRef>
+            <a:effectRef idx="0">
+              <a:schemeClr val="accent1"/>
+            </a:effectRef>
+            <a:fontRef idx="minor">
+              <a:schemeClr val="lt1"/>
+            </a:fontRef>
+          </p:style>
+          <p:txBody>
+            <a:bodyPr rtlCol="0" anchor="ctr"/>
+            <a:lstStyle/>
+            <a:p>
+              <a:pPr algn="ctr"/>
+              <a:endParaRPr lang="fr-FR">
+                <a:solidFill>
+                  <a:schemeClr val="tx1"/>
+                </a:solidFill>
+              </a:endParaRPr>
+            </a:p>
+          </p:txBody>
+        </p:sp>
+        <p:sp>
+          <p:nvSpPr>
+            <p:cNvPr id="6" name="Ellipse 5">
+              <a:extLst>
+                <a:ext uri="{FF2B5EF4-FFF2-40B4-BE49-F238E27FC236}">
+                  <a16:creationId xmlns:a16="http://schemas.microsoft.com/office/drawing/2014/main" id="{D5962C56-D3D6-7875-3EBD-79F29093980A}"/>
+                </a:ext>
+              </a:extLst>
+            </p:cNvPr>
+            <p:cNvSpPr/>
+            <p:nvPr/>
+          </p:nvSpPr>
+          <p:spPr>
+            <a:xfrm>
+              <a:off x="5457825" y="971550"/>
+              <a:ext cx="1360800" cy="1008000"/>
+            </a:xfrm>
+            <a:prstGeom prst="ellipse">
+              <a:avLst/>
+            </a:prstGeom>
+            <a:solidFill>
+              <a:schemeClr val="bg1"/>
+            </a:solidFill>
+            <a:ln>
+              <a:noFill/>
+            </a:ln>
+          </p:spPr>
+          <p:style>
+            <a:lnRef idx="2">
+              <a:schemeClr val="accent1">
+                <a:shade val="15000"/>
+              </a:schemeClr>
+            </a:lnRef>
+            <a:fillRef idx="1">
+              <a:schemeClr val="accent1"/>
+            </a:fillRef>
+            <a:effectRef idx="0">
+              <a:schemeClr val="accent1"/>
+            </a:effectRef>
+            <a:fontRef idx="minor">
+              <a:schemeClr val="lt1"/>
+            </a:fontRef>
+          </p:style>
+          <p:txBody>
+            <a:bodyPr rtlCol="0" anchor="ctr"/>
+            <a:lstStyle/>
+            <a:p>
+              <a:pPr algn="ctr"/>
+              <a:endParaRPr lang="fr-FR"/>
+            </a:p>
+          </p:txBody>
+        </p:sp>
+        <p:sp>
+          <p:nvSpPr>
+            <p:cNvPr id="7" name="Ellipse 6">
+              <a:extLst>
+                <a:ext uri="{FF2B5EF4-FFF2-40B4-BE49-F238E27FC236}">
+                  <a16:creationId xmlns:a16="http://schemas.microsoft.com/office/drawing/2014/main" id="{D831F2A5-4318-DB9C-4653-9656683B34A3}"/>
+                </a:ext>
+              </a:extLst>
+            </p:cNvPr>
+            <p:cNvSpPr/>
+            <p:nvPr/>
+          </p:nvSpPr>
+          <p:spPr>
+            <a:xfrm>
+              <a:off x="7029450" y="2621011"/>
+              <a:ext cx="304800" cy="306450"/>
+            </a:xfrm>
+            <a:prstGeom prst="ellipse">
+              <a:avLst/>
+            </a:prstGeom>
+          </p:spPr>
+          <p:style>
+            <a:lnRef idx="2">
+              <a:schemeClr val="dk1">
+                <a:shade val="15000"/>
+              </a:schemeClr>
+            </a:lnRef>
+            <a:fillRef idx="1">
+              <a:schemeClr val="dk1"/>
+            </a:fillRef>
+            <a:effectRef idx="0">
+              <a:schemeClr val="dk1"/>
+            </a:effectRef>
+            <a:fontRef idx="minor">
+              <a:schemeClr val="lt1"/>
+            </a:fontRef>
+          </p:style>
+          <p:txBody>
+            <a:bodyPr rtlCol="0" anchor="ctr"/>
+            <a:lstStyle/>
+            <a:p>
+              <a:pPr algn="ctr"/>
+              <a:endParaRPr lang="fr-FR"/>
+            </a:p>
+          </p:txBody>
+        </p:sp>
+        <p:sp>
+          <p:nvSpPr>
+            <p:cNvPr id="8" name="Ellipse 7">
+              <a:extLst>
+                <a:ext uri="{FF2B5EF4-FFF2-40B4-BE49-F238E27FC236}">
+                  <a16:creationId xmlns:a16="http://schemas.microsoft.com/office/drawing/2014/main" id="{6379A3DE-84B1-EF86-467B-41231869B792}"/>
+                </a:ext>
+              </a:extLst>
+            </p:cNvPr>
+            <p:cNvSpPr/>
+            <p:nvPr/>
+          </p:nvSpPr>
+          <p:spPr>
+            <a:xfrm>
+              <a:off x="7197900" y="3597886"/>
+              <a:ext cx="304800" cy="306450"/>
+            </a:xfrm>
+            <a:prstGeom prst="ellipse">
+              <a:avLst/>
+            </a:prstGeom>
+          </p:spPr>
+          <p:style>
+            <a:lnRef idx="2">
+              <a:schemeClr val="dk1">
+                <a:shade val="15000"/>
+              </a:schemeClr>
+            </a:lnRef>
+            <a:fillRef idx="1">
+              <a:schemeClr val="dk1"/>
+            </a:fillRef>
+            <a:effectRef idx="0">
+              <a:schemeClr val="dk1"/>
+            </a:effectRef>
+            <a:fontRef idx="minor">
+              <a:schemeClr val="lt1"/>
+            </a:fontRef>
+          </p:style>
+          <p:txBody>
+            <a:bodyPr rtlCol="0" anchor="ctr"/>
+            <a:lstStyle/>
+            <a:p>
+              <a:pPr algn="ctr"/>
+              <a:endParaRPr lang="fr-FR"/>
+            </a:p>
+          </p:txBody>
+        </p:sp>
+        <p:sp>
+          <p:nvSpPr>
+            <p:cNvPr id="9" name="Ellipse 8">
+              <a:extLst>
+                <a:ext uri="{FF2B5EF4-FFF2-40B4-BE49-F238E27FC236}">
+                  <a16:creationId xmlns:a16="http://schemas.microsoft.com/office/drawing/2014/main" id="{279B794C-8103-ACCF-7C3A-F421EE44FD6D}"/>
+                </a:ext>
+              </a:extLst>
+            </p:cNvPr>
+            <p:cNvSpPr/>
+            <p:nvPr/>
+          </p:nvSpPr>
+          <p:spPr>
+            <a:xfrm>
+              <a:off x="6877050" y="4311562"/>
+              <a:ext cx="304800" cy="306450"/>
+            </a:xfrm>
+            <a:prstGeom prst="ellipse">
+              <a:avLst/>
+            </a:prstGeom>
+          </p:spPr>
+          <p:style>
+            <a:lnRef idx="2">
+              <a:schemeClr val="dk1">
+                <a:shade val="15000"/>
+              </a:schemeClr>
+            </a:lnRef>
+            <a:fillRef idx="1">
+              <a:schemeClr val="dk1"/>
+            </a:fillRef>
+            <a:effectRef idx="0">
+              <a:schemeClr val="dk1"/>
+            </a:effectRef>
+            <a:fontRef idx="minor">
+              <a:schemeClr val="lt1"/>
+            </a:fontRef>
+          </p:style>
+          <p:txBody>
+            <a:bodyPr rtlCol="0" anchor="ctr"/>
+            <a:lstStyle/>
+            <a:p>
+              <a:pPr algn="ctr"/>
+              <a:endParaRPr lang="fr-FR"/>
+            </a:p>
+          </p:txBody>
+        </p:sp>
+        <p:sp>
+          <p:nvSpPr>
+            <p:cNvPr id="10" name="Ellipse 9">
+              <a:extLst>
+                <a:ext uri="{FF2B5EF4-FFF2-40B4-BE49-F238E27FC236}">
+                  <a16:creationId xmlns:a16="http://schemas.microsoft.com/office/drawing/2014/main" id="{133B1C96-24B4-5D57-25AA-188044F7560E}"/>
+                </a:ext>
+              </a:extLst>
+            </p:cNvPr>
+            <p:cNvSpPr/>
+            <p:nvPr/>
+          </p:nvSpPr>
+          <p:spPr>
+            <a:xfrm>
+              <a:off x="6020401" y="4641414"/>
+              <a:ext cx="304800" cy="306450"/>
+            </a:xfrm>
+            <a:prstGeom prst="ellipse">
+              <a:avLst/>
+            </a:prstGeom>
+          </p:spPr>
+          <p:style>
+            <a:lnRef idx="2">
+              <a:schemeClr val="dk1">
+                <a:shade val="15000"/>
+              </a:schemeClr>
+            </a:lnRef>
+            <a:fillRef idx="1">
+              <a:schemeClr val="dk1"/>
+            </a:fillRef>
+            <a:effectRef idx="0">
+              <a:schemeClr val="dk1"/>
+            </a:effectRef>
+            <a:fontRef idx="minor">
+              <a:schemeClr val="lt1"/>
+            </a:fontRef>
+          </p:style>
+          <p:txBody>
+            <a:bodyPr rtlCol="0" anchor="ctr"/>
+            <a:lstStyle/>
+            <a:p>
+              <a:pPr algn="ctr"/>
+              <a:endParaRPr lang="fr-FR"/>
+            </a:p>
+          </p:txBody>
+        </p:sp>
+        <p:sp>
+          <p:nvSpPr>
+            <p:cNvPr id="11" name="Ellipse 10">
+              <a:extLst>
+                <a:ext uri="{FF2B5EF4-FFF2-40B4-BE49-F238E27FC236}">
+                  <a16:creationId xmlns:a16="http://schemas.microsoft.com/office/drawing/2014/main" id="{61BD8E97-AE5E-938A-E647-31684CD3F46E}"/>
+                </a:ext>
+              </a:extLst>
+            </p:cNvPr>
+            <p:cNvSpPr/>
+            <p:nvPr/>
+          </p:nvSpPr>
+          <p:spPr>
+            <a:xfrm>
+              <a:off x="5039325" y="4311562"/>
+              <a:ext cx="304800" cy="306450"/>
+            </a:xfrm>
+            <a:prstGeom prst="ellipse">
+              <a:avLst/>
+            </a:prstGeom>
+          </p:spPr>
+          <p:style>
+            <a:lnRef idx="2">
+              <a:schemeClr val="dk1">
+                <a:shade val="15000"/>
+              </a:schemeClr>
+            </a:lnRef>
+            <a:fillRef idx="1">
+              <a:schemeClr val="dk1"/>
+            </a:fillRef>
+            <a:effectRef idx="0">
+              <a:schemeClr val="dk1"/>
+            </a:effectRef>
+            <a:fontRef idx="minor">
+              <a:schemeClr val="lt1"/>
+            </a:fontRef>
+          </p:style>
+          <p:txBody>
+            <a:bodyPr rtlCol="0" anchor="ctr"/>
+            <a:lstStyle/>
+            <a:p>
+              <a:pPr algn="ctr"/>
+              <a:endParaRPr lang="fr-FR"/>
+            </a:p>
+          </p:txBody>
+        </p:sp>
+        <p:sp>
+          <p:nvSpPr>
+            <p:cNvPr id="12" name="Ellipse 11">
+              <a:extLst>
+                <a:ext uri="{FF2B5EF4-FFF2-40B4-BE49-F238E27FC236}">
+                  <a16:creationId xmlns:a16="http://schemas.microsoft.com/office/drawing/2014/main" id="{F66C2C51-A024-815E-A62C-831F349AEDF7}"/>
+                </a:ext>
+              </a:extLst>
+            </p:cNvPr>
+            <p:cNvSpPr/>
+            <p:nvPr/>
+          </p:nvSpPr>
+          <p:spPr>
+            <a:xfrm>
+              <a:off x="4614301" y="3397023"/>
+              <a:ext cx="304800" cy="306450"/>
+            </a:xfrm>
+            <a:prstGeom prst="ellipse">
+              <a:avLst/>
+            </a:prstGeom>
+          </p:spPr>
+          <p:style>
+            <a:lnRef idx="2">
+              <a:schemeClr val="dk1">
+                <a:shade val="15000"/>
+              </a:schemeClr>
+            </a:lnRef>
+            <a:fillRef idx="1">
+              <a:schemeClr val="dk1"/>
+            </a:fillRef>
+            <a:effectRef idx="0">
+              <a:schemeClr val="dk1"/>
+            </a:effectRef>
+            <a:fontRef idx="minor">
+              <a:schemeClr val="lt1"/>
+            </a:fontRef>
+          </p:style>
+          <p:txBody>
+            <a:bodyPr rtlCol="0" anchor="ctr"/>
+            <a:lstStyle/>
+            <a:p>
+              <a:pPr algn="ctr"/>
+              <a:endParaRPr lang="fr-FR"/>
+            </a:p>
+          </p:txBody>
+        </p:sp>
+        <p:sp>
+          <p:nvSpPr>
+            <p:cNvPr id="13" name="Ellipse 12">
+              <a:extLst>
+                <a:ext uri="{FF2B5EF4-FFF2-40B4-BE49-F238E27FC236}">
+                  <a16:creationId xmlns:a16="http://schemas.microsoft.com/office/drawing/2014/main" id="{3796E85B-EECE-6A04-A33E-BC634F946F11}"/>
+                </a:ext>
+              </a:extLst>
+            </p:cNvPr>
+            <p:cNvSpPr/>
+            <p:nvPr/>
+          </p:nvSpPr>
+          <p:spPr>
+            <a:xfrm>
+              <a:off x="4966688" y="2420606"/>
+              <a:ext cx="304800" cy="306450"/>
+            </a:xfrm>
+            <a:prstGeom prst="ellipse">
+              <a:avLst/>
+            </a:prstGeom>
+          </p:spPr>
+          <p:style>
+            <a:lnRef idx="2">
+              <a:schemeClr val="dk1">
+                <a:shade val="15000"/>
+              </a:schemeClr>
+            </a:lnRef>
+            <a:fillRef idx="1">
+              <a:schemeClr val="dk1"/>
+            </a:fillRef>
+            <a:effectRef idx="0">
+              <a:schemeClr val="dk1"/>
+            </a:effectRef>
+            <a:fontRef idx="minor">
+              <a:schemeClr val="lt1"/>
+            </a:fontRef>
+          </p:style>
+          <p:txBody>
+            <a:bodyPr rtlCol="0" anchor="ctr"/>
+            <a:lstStyle/>
+            <a:p>
+              <a:pPr algn="ctr"/>
+              <a:endParaRPr lang="fr-FR" dirty="0"/>
+            </a:p>
+          </p:txBody>
+        </p:sp>
+        <p:sp>
+          <p:nvSpPr>
+            <p:cNvPr id="14" name="ZoneTexte 13">
+              <a:extLst>
+                <a:ext uri="{FF2B5EF4-FFF2-40B4-BE49-F238E27FC236}">
+                  <a16:creationId xmlns:a16="http://schemas.microsoft.com/office/drawing/2014/main" id="{F639BCA5-A8B0-2653-B977-04B8CD66F1E5}"/>
+                </a:ext>
+              </a:extLst>
+            </p:cNvPr>
+            <p:cNvSpPr txBox="1"/>
+            <p:nvPr/>
+          </p:nvSpPr>
+          <p:spPr>
+            <a:xfrm>
+              <a:off x="7219950" y="2294803"/>
+              <a:ext cx="228600" cy="369332"/>
+            </a:xfrm>
+            <a:prstGeom prst="rect">
+              <a:avLst/>
+            </a:prstGeom>
             <a:noFill/>
-          </a:ln>
-        </p:spPr>
-        <p:style>
-          <a:lnRef idx="2">
-            <a:schemeClr val="accent1">
-              <a:shade val="15000"/>
-            </a:schemeClr>
-          </a:lnRef>
-          <a:fillRef idx="1">
-            <a:schemeClr val="accent1"/>
-          </a:fillRef>
-          <a:effectRef idx="0">
-            <a:schemeClr val="accent1"/>
-          </a:effectRef>
-          <a:fontRef idx="minor">
-            <a:schemeClr val="lt1"/>
-          </a:fontRef>
-        </p:style>
-        <p:txBody>
-          <a:bodyPr rtlCol="0" anchor="ctr"/>
-          <a:lstStyle/>
-          <a:p>
-            <a:pPr algn="ctr"/>
-            <a:endParaRPr lang="fr-FR"/>
-          </a:p>
-        </p:txBody>
-      </p:sp>
-      <p:sp>
-        <p:nvSpPr>
-          <p:cNvPr id="7" name="Ellipse 6">
-            <a:extLst>
-              <a:ext uri="{FF2B5EF4-FFF2-40B4-BE49-F238E27FC236}">
-                <a16:creationId xmlns:a16="http://schemas.microsoft.com/office/drawing/2014/main" id="{D831F2A5-4318-DB9C-4653-9656683B34A3}"/>
-              </a:ext>
-            </a:extLst>
-          </p:cNvPr>
-          <p:cNvSpPr/>
-          <p:nvPr/>
-        </p:nvSpPr>
-        <p:spPr>
-          <a:xfrm>
-            <a:off x="7029450" y="2621011"/>
-            <a:ext cx="304800" cy="306450"/>
-          </a:xfrm>
-          <a:prstGeom prst="ellipse">
-            <a:avLst/>
-          </a:prstGeom>
-        </p:spPr>
-        <p:style>
-          <a:lnRef idx="2">
-            <a:schemeClr val="dk1">
-              <a:shade val="15000"/>
-            </a:schemeClr>
-          </a:lnRef>
-          <a:fillRef idx="1">
-            <a:schemeClr val="dk1"/>
-          </a:fillRef>
-          <a:effectRef idx="0">
-            <a:schemeClr val="dk1"/>
-          </a:effectRef>
-          <a:fontRef idx="minor">
-            <a:schemeClr val="lt1"/>
-          </a:fontRef>
-        </p:style>
-        <p:txBody>
-          <a:bodyPr rtlCol="0" anchor="ctr"/>
-          <a:lstStyle/>
-          <a:p>
-            <a:pPr algn="ctr"/>
-            <a:endParaRPr lang="fr-FR"/>
-          </a:p>
-        </p:txBody>
-      </p:sp>
-      <p:sp>
-        <p:nvSpPr>
-          <p:cNvPr id="8" name="Ellipse 7">
-            <a:extLst>
-              <a:ext uri="{FF2B5EF4-FFF2-40B4-BE49-F238E27FC236}">
-                <a16:creationId xmlns:a16="http://schemas.microsoft.com/office/drawing/2014/main" id="{6379A3DE-84B1-EF86-467B-41231869B792}"/>
-              </a:ext>
-            </a:extLst>
-          </p:cNvPr>
-          <p:cNvSpPr/>
-          <p:nvPr/>
-        </p:nvSpPr>
-        <p:spPr>
-          <a:xfrm>
-            <a:off x="7197900" y="3597886"/>
-            <a:ext cx="304800" cy="306450"/>
-          </a:xfrm>
-          <a:prstGeom prst="ellipse">
-            <a:avLst/>
-          </a:prstGeom>
-        </p:spPr>
-        <p:style>
-          <a:lnRef idx="2">
-            <a:schemeClr val="dk1">
-              <a:shade val="15000"/>
-            </a:schemeClr>
-          </a:lnRef>
-          <a:fillRef idx="1">
-            <a:schemeClr val="dk1"/>
-          </a:fillRef>
-          <a:effectRef idx="0">
-            <a:schemeClr val="dk1"/>
-          </a:effectRef>
-          <a:fontRef idx="minor">
-            <a:schemeClr val="lt1"/>
-          </a:fontRef>
-        </p:style>
-        <p:txBody>
-          <a:bodyPr rtlCol="0" anchor="ctr"/>
-          <a:lstStyle/>
-          <a:p>
-            <a:pPr algn="ctr"/>
-            <a:endParaRPr lang="fr-FR"/>
-          </a:p>
-        </p:txBody>
-      </p:sp>
-      <p:sp>
-        <p:nvSpPr>
-          <p:cNvPr id="9" name="Ellipse 8">
-            <a:extLst>
-              <a:ext uri="{FF2B5EF4-FFF2-40B4-BE49-F238E27FC236}">
-                <a16:creationId xmlns:a16="http://schemas.microsoft.com/office/drawing/2014/main" id="{279B794C-8103-ACCF-7C3A-F421EE44FD6D}"/>
-              </a:ext>
-            </a:extLst>
-          </p:cNvPr>
-          <p:cNvSpPr/>
-          <p:nvPr/>
-        </p:nvSpPr>
-        <p:spPr>
-          <a:xfrm>
-            <a:off x="6877050" y="4311562"/>
-            <a:ext cx="304800" cy="306450"/>
-          </a:xfrm>
-          <a:prstGeom prst="ellipse">
-            <a:avLst/>
-          </a:prstGeom>
-        </p:spPr>
-        <p:style>
-          <a:lnRef idx="2">
-            <a:schemeClr val="dk1">
-              <a:shade val="15000"/>
-            </a:schemeClr>
-          </a:lnRef>
-          <a:fillRef idx="1">
-            <a:schemeClr val="dk1"/>
-          </a:fillRef>
-          <a:effectRef idx="0">
-            <a:schemeClr val="dk1"/>
-          </a:effectRef>
-          <a:fontRef idx="minor">
-            <a:schemeClr val="lt1"/>
-          </a:fontRef>
-        </p:style>
-        <p:txBody>
-          <a:bodyPr rtlCol="0" anchor="ctr"/>
-          <a:lstStyle/>
-          <a:p>
-            <a:pPr algn="ctr"/>
-            <a:endParaRPr lang="fr-FR"/>
-          </a:p>
-        </p:txBody>
-      </p:sp>
-      <p:sp>
-        <p:nvSpPr>
-          <p:cNvPr id="10" name="Ellipse 9">
-            <a:extLst>
-              <a:ext uri="{FF2B5EF4-FFF2-40B4-BE49-F238E27FC236}">
-                <a16:creationId xmlns:a16="http://schemas.microsoft.com/office/drawing/2014/main" id="{133B1C96-24B4-5D57-25AA-188044F7560E}"/>
-              </a:ext>
-            </a:extLst>
-          </p:cNvPr>
-          <p:cNvSpPr/>
-          <p:nvPr/>
-        </p:nvSpPr>
-        <p:spPr>
-          <a:xfrm>
-            <a:off x="6020401" y="4641414"/>
-            <a:ext cx="304800" cy="306450"/>
-          </a:xfrm>
-          <a:prstGeom prst="ellipse">
-            <a:avLst/>
-          </a:prstGeom>
-        </p:spPr>
-        <p:style>
-          <a:lnRef idx="2">
-            <a:schemeClr val="dk1">
-              <a:shade val="15000"/>
-            </a:schemeClr>
-          </a:lnRef>
-          <a:fillRef idx="1">
-            <a:schemeClr val="dk1"/>
-          </a:fillRef>
-          <a:effectRef idx="0">
-            <a:schemeClr val="dk1"/>
-          </a:effectRef>
-          <a:fontRef idx="minor">
-            <a:schemeClr val="lt1"/>
-          </a:fontRef>
-        </p:style>
-        <p:txBody>
-          <a:bodyPr rtlCol="0" anchor="ctr"/>
-          <a:lstStyle/>
-          <a:p>
-            <a:pPr algn="ctr"/>
-            <a:endParaRPr lang="fr-FR"/>
-          </a:p>
-        </p:txBody>
-      </p:sp>
-      <p:sp>
-        <p:nvSpPr>
-          <p:cNvPr id="11" name="Ellipse 10">
-            <a:extLst>
-              <a:ext uri="{FF2B5EF4-FFF2-40B4-BE49-F238E27FC236}">
-                <a16:creationId xmlns:a16="http://schemas.microsoft.com/office/drawing/2014/main" id="{61BD8E97-AE5E-938A-E647-31684CD3F46E}"/>
-              </a:ext>
-            </a:extLst>
-          </p:cNvPr>
-          <p:cNvSpPr/>
-          <p:nvPr/>
-        </p:nvSpPr>
-        <p:spPr>
-          <a:xfrm>
-            <a:off x="5039325" y="4311562"/>
-            <a:ext cx="304800" cy="306450"/>
-          </a:xfrm>
-          <a:prstGeom prst="ellipse">
-            <a:avLst/>
-          </a:prstGeom>
-        </p:spPr>
-        <p:style>
-          <a:lnRef idx="2">
-            <a:schemeClr val="dk1">
-              <a:shade val="15000"/>
-            </a:schemeClr>
-          </a:lnRef>
-          <a:fillRef idx="1">
-            <a:schemeClr val="dk1"/>
-          </a:fillRef>
-          <a:effectRef idx="0">
-            <a:schemeClr val="dk1"/>
-          </a:effectRef>
-          <a:fontRef idx="minor">
-            <a:schemeClr val="lt1"/>
-          </a:fontRef>
-        </p:style>
-        <p:txBody>
-          <a:bodyPr rtlCol="0" anchor="ctr"/>
-          <a:lstStyle/>
-          <a:p>
-            <a:pPr algn="ctr"/>
-            <a:endParaRPr lang="fr-FR"/>
-          </a:p>
-        </p:txBody>
-      </p:sp>
-      <p:sp>
-        <p:nvSpPr>
-          <p:cNvPr id="12" name="Ellipse 11">
-            <a:extLst>
-              <a:ext uri="{FF2B5EF4-FFF2-40B4-BE49-F238E27FC236}">
-                <a16:creationId xmlns:a16="http://schemas.microsoft.com/office/drawing/2014/main" id="{F66C2C51-A024-815E-A62C-831F349AEDF7}"/>
-              </a:ext>
-            </a:extLst>
-          </p:cNvPr>
-          <p:cNvSpPr/>
-          <p:nvPr/>
-        </p:nvSpPr>
-        <p:spPr>
-          <a:xfrm>
-            <a:off x="4614301" y="3397023"/>
-            <a:ext cx="304800" cy="306450"/>
-          </a:xfrm>
-          <a:prstGeom prst="ellipse">
-            <a:avLst/>
-          </a:prstGeom>
-        </p:spPr>
-        <p:style>
-          <a:lnRef idx="2">
-            <a:schemeClr val="dk1">
-              <a:shade val="15000"/>
-            </a:schemeClr>
-          </a:lnRef>
-          <a:fillRef idx="1">
-            <a:schemeClr val="dk1"/>
-          </a:fillRef>
-          <a:effectRef idx="0">
-            <a:schemeClr val="dk1"/>
-          </a:effectRef>
-          <a:fontRef idx="minor">
-            <a:schemeClr val="lt1"/>
-          </a:fontRef>
-        </p:style>
-        <p:txBody>
-          <a:bodyPr rtlCol="0" anchor="ctr"/>
-          <a:lstStyle/>
-          <a:p>
-            <a:pPr algn="ctr"/>
-            <a:endParaRPr lang="fr-FR"/>
-          </a:p>
-        </p:txBody>
-      </p:sp>
-      <p:sp>
-        <p:nvSpPr>
-          <p:cNvPr id="13" name="Ellipse 12">
-            <a:extLst>
-              <a:ext uri="{FF2B5EF4-FFF2-40B4-BE49-F238E27FC236}">
-                <a16:creationId xmlns:a16="http://schemas.microsoft.com/office/drawing/2014/main" id="{3796E85B-EECE-6A04-A33E-BC634F946F11}"/>
-              </a:ext>
-            </a:extLst>
-          </p:cNvPr>
-          <p:cNvSpPr/>
-          <p:nvPr/>
-        </p:nvSpPr>
-        <p:spPr>
-          <a:xfrm>
-            <a:off x="4966688" y="2420606"/>
-            <a:ext cx="304800" cy="306450"/>
-          </a:xfrm>
-          <a:prstGeom prst="ellipse">
-            <a:avLst/>
-          </a:prstGeom>
-        </p:spPr>
-        <p:style>
-          <a:lnRef idx="2">
-            <a:schemeClr val="dk1">
-              <a:shade val="15000"/>
-            </a:schemeClr>
-          </a:lnRef>
-          <a:fillRef idx="1">
-            <a:schemeClr val="dk1"/>
-          </a:fillRef>
-          <a:effectRef idx="0">
-            <a:schemeClr val="dk1"/>
-          </a:effectRef>
-          <a:fontRef idx="minor">
-            <a:schemeClr val="lt1"/>
-          </a:fontRef>
-        </p:style>
-        <p:txBody>
-          <a:bodyPr rtlCol="0" anchor="ctr"/>
-          <a:lstStyle/>
-          <a:p>
-            <a:pPr algn="ctr"/>
-            <a:endParaRPr lang="fr-FR" dirty="0"/>
-          </a:p>
-        </p:txBody>
-      </p:sp>
-      <p:sp>
-        <p:nvSpPr>
-          <p:cNvPr id="14" name="ZoneTexte 13">
-            <a:extLst>
-              <a:ext uri="{FF2B5EF4-FFF2-40B4-BE49-F238E27FC236}">
-                <a16:creationId xmlns:a16="http://schemas.microsoft.com/office/drawing/2014/main" id="{F639BCA5-A8B0-2653-B977-04B8CD66F1E5}"/>
-              </a:ext>
-            </a:extLst>
-          </p:cNvPr>
-          <p:cNvSpPr txBox="1"/>
-          <p:nvPr/>
-        </p:nvSpPr>
-        <p:spPr>
-          <a:xfrm>
-            <a:off x="7219950" y="2294803"/>
-            <a:ext cx="228600" cy="369332"/>
-          </a:xfrm>
-          <a:prstGeom prst="rect">
-            <a:avLst/>
-          </a:prstGeom>
-          <a:noFill/>
-        </p:spPr>
-        <p:txBody>
-          <a:bodyPr wrap="square" rtlCol="0">
-            <a:spAutoFit/>
-          </a:bodyPr>
-          <a:lstStyle/>
-          <a:p>
-            <a:r>
-              <a:rPr lang="fr-FR" b="1" dirty="0"/>
-              <a:t>1</a:t>
-            </a:r>
-          </a:p>
-        </p:txBody>
-      </p:sp>
-      <p:sp>
-        <p:nvSpPr>
-          <p:cNvPr id="15" name="ZoneTexte 14">
-            <a:extLst>
-              <a:ext uri="{FF2B5EF4-FFF2-40B4-BE49-F238E27FC236}">
-                <a16:creationId xmlns:a16="http://schemas.microsoft.com/office/drawing/2014/main" id="{E8F36A1E-6506-4CA0-FAE1-B33CA3082642}"/>
-              </a:ext>
-            </a:extLst>
-          </p:cNvPr>
-          <p:cNvSpPr txBox="1"/>
-          <p:nvPr/>
-        </p:nvSpPr>
-        <p:spPr>
-          <a:xfrm>
-            <a:off x="7540200" y="3335908"/>
-            <a:ext cx="228600" cy="369332"/>
-          </a:xfrm>
-          <a:prstGeom prst="rect">
-            <a:avLst/>
-          </a:prstGeom>
-          <a:noFill/>
-        </p:spPr>
-        <p:txBody>
-          <a:bodyPr wrap="square" rtlCol="0">
-            <a:spAutoFit/>
-          </a:bodyPr>
-          <a:lstStyle/>
-          <a:p>
-            <a:r>
-              <a:rPr lang="fr-FR" b="1" dirty="0"/>
-              <a:t>2</a:t>
-            </a:r>
-          </a:p>
-        </p:txBody>
-      </p:sp>
-      <p:sp>
-        <p:nvSpPr>
-          <p:cNvPr id="16" name="ZoneTexte 15">
-            <a:extLst>
-              <a:ext uri="{FF2B5EF4-FFF2-40B4-BE49-F238E27FC236}">
-                <a16:creationId xmlns:a16="http://schemas.microsoft.com/office/drawing/2014/main" id="{795ADFB5-CF07-1BD6-A5EA-719B89500AA1}"/>
-              </a:ext>
-            </a:extLst>
-          </p:cNvPr>
-          <p:cNvSpPr txBox="1"/>
-          <p:nvPr/>
-        </p:nvSpPr>
-        <p:spPr>
-          <a:xfrm>
-            <a:off x="7121700" y="4062793"/>
-            <a:ext cx="228600" cy="369332"/>
-          </a:xfrm>
-          <a:prstGeom prst="rect">
-            <a:avLst/>
-          </a:prstGeom>
-          <a:noFill/>
-        </p:spPr>
-        <p:txBody>
-          <a:bodyPr wrap="square" rtlCol="0">
-            <a:spAutoFit/>
-          </a:bodyPr>
-          <a:lstStyle/>
-          <a:p>
-            <a:r>
-              <a:rPr lang="fr-FR" b="1" dirty="0"/>
-              <a:t>3</a:t>
-            </a:r>
-          </a:p>
-        </p:txBody>
-      </p:sp>
-      <p:sp>
-        <p:nvSpPr>
-          <p:cNvPr id="17" name="ZoneTexte 16">
-            <a:extLst>
-              <a:ext uri="{FF2B5EF4-FFF2-40B4-BE49-F238E27FC236}">
-                <a16:creationId xmlns:a16="http://schemas.microsoft.com/office/drawing/2014/main" id="{BF93F58F-A6A6-EAB6-0385-E1E05EB06513}"/>
-              </a:ext>
-            </a:extLst>
-          </p:cNvPr>
-          <p:cNvSpPr txBox="1"/>
-          <p:nvPr/>
-        </p:nvSpPr>
-        <p:spPr>
-          <a:xfrm>
-            <a:off x="5904900" y="4180278"/>
-            <a:ext cx="228600" cy="369332"/>
-          </a:xfrm>
-          <a:prstGeom prst="rect">
-            <a:avLst/>
-          </a:prstGeom>
-          <a:noFill/>
-        </p:spPr>
-        <p:txBody>
-          <a:bodyPr wrap="square" rtlCol="0">
-            <a:spAutoFit/>
-          </a:bodyPr>
-          <a:lstStyle/>
-          <a:p>
-            <a:r>
-              <a:rPr lang="fr-FR" b="1" dirty="0"/>
-              <a:t>4</a:t>
-            </a:r>
-          </a:p>
-        </p:txBody>
-      </p:sp>
-      <p:sp>
-        <p:nvSpPr>
-          <p:cNvPr id="18" name="ZoneTexte 17">
-            <a:extLst>
-              <a:ext uri="{FF2B5EF4-FFF2-40B4-BE49-F238E27FC236}">
-                <a16:creationId xmlns:a16="http://schemas.microsoft.com/office/drawing/2014/main" id="{7D34EADC-40D9-4784-3418-638514FC6ED0}"/>
-              </a:ext>
-            </a:extLst>
-          </p:cNvPr>
-          <p:cNvSpPr txBox="1"/>
-          <p:nvPr/>
-        </p:nvSpPr>
-        <p:spPr>
-          <a:xfrm>
-            <a:off x="4738088" y="3886961"/>
-            <a:ext cx="228600" cy="369332"/>
-          </a:xfrm>
-          <a:prstGeom prst="rect">
-            <a:avLst/>
-          </a:prstGeom>
-          <a:noFill/>
-        </p:spPr>
-        <p:txBody>
-          <a:bodyPr wrap="square" rtlCol="0">
-            <a:spAutoFit/>
-          </a:bodyPr>
-          <a:lstStyle/>
-          <a:p>
-            <a:r>
-              <a:rPr lang="fr-FR" b="1" dirty="0"/>
-              <a:t>5</a:t>
-            </a:r>
-          </a:p>
-        </p:txBody>
-      </p:sp>
-      <p:sp>
-        <p:nvSpPr>
-          <p:cNvPr id="19" name="ZoneTexte 18">
-            <a:extLst>
-              <a:ext uri="{FF2B5EF4-FFF2-40B4-BE49-F238E27FC236}">
-                <a16:creationId xmlns:a16="http://schemas.microsoft.com/office/drawing/2014/main" id="{52540EF2-9821-541C-AC5C-BCD51FE6D302}"/>
-              </a:ext>
-            </a:extLst>
-          </p:cNvPr>
-          <p:cNvSpPr txBox="1"/>
-          <p:nvPr/>
-        </p:nvSpPr>
-        <p:spPr>
-          <a:xfrm>
-            <a:off x="4377078" y="3002847"/>
-            <a:ext cx="228600" cy="369332"/>
-          </a:xfrm>
-          <a:prstGeom prst="rect">
-            <a:avLst/>
-          </a:prstGeom>
-          <a:noFill/>
-        </p:spPr>
-        <p:txBody>
-          <a:bodyPr wrap="square" rtlCol="0">
-            <a:spAutoFit/>
-          </a:bodyPr>
-          <a:lstStyle/>
-          <a:p>
-            <a:r>
-              <a:rPr lang="fr-FR" b="1" dirty="0"/>
-              <a:t>6</a:t>
-            </a:r>
-          </a:p>
-        </p:txBody>
-      </p:sp>
-      <p:sp>
-        <p:nvSpPr>
-          <p:cNvPr id="20" name="ZoneTexte 19">
-            <a:extLst>
-              <a:ext uri="{FF2B5EF4-FFF2-40B4-BE49-F238E27FC236}">
-                <a16:creationId xmlns:a16="http://schemas.microsoft.com/office/drawing/2014/main" id="{B7F9B253-7350-B9D3-E3F6-F638FEE26820}"/>
-              </a:ext>
-            </a:extLst>
-          </p:cNvPr>
-          <p:cNvSpPr txBox="1"/>
-          <p:nvPr/>
-        </p:nvSpPr>
-        <p:spPr>
-          <a:xfrm>
-            <a:off x="4900614" y="2043328"/>
-            <a:ext cx="228599" cy="369332"/>
-          </a:xfrm>
-          <a:prstGeom prst="rect">
-            <a:avLst/>
-          </a:prstGeom>
-          <a:noFill/>
-        </p:spPr>
-        <p:txBody>
-          <a:bodyPr wrap="square" rtlCol="0">
-            <a:spAutoFit/>
-          </a:bodyPr>
-          <a:lstStyle/>
-          <a:p>
-            <a:r>
-              <a:rPr lang="fr-FR" b="1" dirty="0"/>
-              <a:t>7</a:t>
-            </a:r>
-          </a:p>
-        </p:txBody>
-      </p:sp>
-      <p:sp>
-        <p:nvSpPr>
-          <p:cNvPr id="2" name="ZoneTexte 1">
-            <a:extLst>
-              <a:ext uri="{FF2B5EF4-FFF2-40B4-BE49-F238E27FC236}">
-                <a16:creationId xmlns:a16="http://schemas.microsoft.com/office/drawing/2014/main" id="{D3893B69-9B04-FA90-AEFE-AF7724D34F1C}"/>
-              </a:ext>
-            </a:extLst>
-          </p:cNvPr>
-          <p:cNvSpPr txBox="1"/>
-          <p:nvPr/>
-        </p:nvSpPr>
-        <p:spPr>
-          <a:xfrm>
-            <a:off x="857250" y="647700"/>
-            <a:ext cx="3960000" cy="369332"/>
-          </a:xfrm>
-          <a:prstGeom prst="rect">
-            <a:avLst/>
-          </a:prstGeom>
-          <a:noFill/>
-        </p:spPr>
-        <p:txBody>
-          <a:bodyPr wrap="square" rtlCol="0">
-            <a:spAutoFit/>
-          </a:bodyPr>
-          <a:lstStyle/>
-          <a:p>
-            <a:r>
-              <a:rPr lang="fr-FR" dirty="0"/>
-              <a:t>Schéma Atténuateur + phototransistor</a:t>
-            </a:r>
-          </a:p>
-        </p:txBody>
-      </p:sp>
+          </p:spPr>
+          <p:txBody>
+            <a:bodyPr wrap="square" rtlCol="0">
+              <a:spAutoFit/>
+            </a:bodyPr>
+            <a:lstStyle/>
+            <a:p>
+              <a:r>
+                <a:rPr lang="fr-FR" b="1" dirty="0"/>
+                <a:t>1</a:t>
+              </a:r>
+            </a:p>
+          </p:txBody>
+        </p:sp>
+        <p:sp>
+          <p:nvSpPr>
+            <p:cNvPr id="15" name="ZoneTexte 14">
+              <a:extLst>
+                <a:ext uri="{FF2B5EF4-FFF2-40B4-BE49-F238E27FC236}">
+                  <a16:creationId xmlns:a16="http://schemas.microsoft.com/office/drawing/2014/main" id="{E8F36A1E-6506-4CA0-FAE1-B33CA3082642}"/>
+                </a:ext>
+              </a:extLst>
+            </p:cNvPr>
+            <p:cNvSpPr txBox="1"/>
+            <p:nvPr/>
+          </p:nvSpPr>
+          <p:spPr>
+            <a:xfrm>
+              <a:off x="7540200" y="3335908"/>
+              <a:ext cx="228600" cy="369332"/>
+            </a:xfrm>
+            <a:prstGeom prst="rect">
+              <a:avLst/>
+            </a:prstGeom>
+            <a:noFill/>
+          </p:spPr>
+          <p:txBody>
+            <a:bodyPr wrap="square" rtlCol="0">
+              <a:spAutoFit/>
+            </a:bodyPr>
+            <a:lstStyle/>
+            <a:p>
+              <a:r>
+                <a:rPr lang="fr-FR" b="1" dirty="0"/>
+                <a:t>2</a:t>
+              </a:r>
+            </a:p>
+          </p:txBody>
+        </p:sp>
+        <p:sp>
+          <p:nvSpPr>
+            <p:cNvPr id="16" name="ZoneTexte 15">
+              <a:extLst>
+                <a:ext uri="{FF2B5EF4-FFF2-40B4-BE49-F238E27FC236}">
+                  <a16:creationId xmlns:a16="http://schemas.microsoft.com/office/drawing/2014/main" id="{795ADFB5-CF07-1BD6-A5EA-719B89500AA1}"/>
+                </a:ext>
+              </a:extLst>
+            </p:cNvPr>
+            <p:cNvSpPr txBox="1"/>
+            <p:nvPr/>
+          </p:nvSpPr>
+          <p:spPr>
+            <a:xfrm>
+              <a:off x="7121700" y="4062793"/>
+              <a:ext cx="228600" cy="369332"/>
+            </a:xfrm>
+            <a:prstGeom prst="rect">
+              <a:avLst/>
+            </a:prstGeom>
+            <a:noFill/>
+          </p:spPr>
+          <p:txBody>
+            <a:bodyPr wrap="square" rtlCol="0">
+              <a:spAutoFit/>
+            </a:bodyPr>
+            <a:lstStyle/>
+            <a:p>
+              <a:r>
+                <a:rPr lang="fr-FR" b="1" dirty="0"/>
+                <a:t>3</a:t>
+              </a:r>
+            </a:p>
+          </p:txBody>
+        </p:sp>
+        <p:sp>
+          <p:nvSpPr>
+            <p:cNvPr id="17" name="ZoneTexte 16">
+              <a:extLst>
+                <a:ext uri="{FF2B5EF4-FFF2-40B4-BE49-F238E27FC236}">
+                  <a16:creationId xmlns:a16="http://schemas.microsoft.com/office/drawing/2014/main" id="{BF93F58F-A6A6-EAB6-0385-E1E05EB06513}"/>
+                </a:ext>
+              </a:extLst>
+            </p:cNvPr>
+            <p:cNvSpPr txBox="1"/>
+            <p:nvPr/>
+          </p:nvSpPr>
+          <p:spPr>
+            <a:xfrm>
+              <a:off x="5904900" y="4180278"/>
+              <a:ext cx="228600" cy="369332"/>
+            </a:xfrm>
+            <a:prstGeom prst="rect">
+              <a:avLst/>
+            </a:prstGeom>
+            <a:noFill/>
+          </p:spPr>
+          <p:txBody>
+            <a:bodyPr wrap="square" rtlCol="0">
+              <a:spAutoFit/>
+            </a:bodyPr>
+            <a:lstStyle/>
+            <a:p>
+              <a:r>
+                <a:rPr lang="fr-FR" b="1" dirty="0"/>
+                <a:t>4</a:t>
+              </a:r>
+            </a:p>
+          </p:txBody>
+        </p:sp>
+        <p:sp>
+          <p:nvSpPr>
+            <p:cNvPr id="18" name="ZoneTexte 17">
+              <a:extLst>
+                <a:ext uri="{FF2B5EF4-FFF2-40B4-BE49-F238E27FC236}">
+                  <a16:creationId xmlns:a16="http://schemas.microsoft.com/office/drawing/2014/main" id="{7D34EADC-40D9-4784-3418-638514FC6ED0}"/>
+                </a:ext>
+              </a:extLst>
+            </p:cNvPr>
+            <p:cNvSpPr txBox="1"/>
+            <p:nvPr/>
+          </p:nvSpPr>
+          <p:spPr>
+            <a:xfrm>
+              <a:off x="4738088" y="3886961"/>
+              <a:ext cx="228600" cy="369332"/>
+            </a:xfrm>
+            <a:prstGeom prst="rect">
+              <a:avLst/>
+            </a:prstGeom>
+            <a:noFill/>
+          </p:spPr>
+          <p:txBody>
+            <a:bodyPr wrap="square" rtlCol="0">
+              <a:spAutoFit/>
+            </a:bodyPr>
+            <a:lstStyle/>
+            <a:p>
+              <a:r>
+                <a:rPr lang="fr-FR" b="1" dirty="0"/>
+                <a:t>5</a:t>
+              </a:r>
+            </a:p>
+          </p:txBody>
+        </p:sp>
+        <p:sp>
+          <p:nvSpPr>
+            <p:cNvPr id="19" name="ZoneTexte 18">
+              <a:extLst>
+                <a:ext uri="{FF2B5EF4-FFF2-40B4-BE49-F238E27FC236}">
+                  <a16:creationId xmlns:a16="http://schemas.microsoft.com/office/drawing/2014/main" id="{52540EF2-9821-541C-AC5C-BCD51FE6D302}"/>
+                </a:ext>
+              </a:extLst>
+            </p:cNvPr>
+            <p:cNvSpPr txBox="1"/>
+            <p:nvPr/>
+          </p:nvSpPr>
+          <p:spPr>
+            <a:xfrm>
+              <a:off x="4377078" y="3002847"/>
+              <a:ext cx="228600" cy="369332"/>
+            </a:xfrm>
+            <a:prstGeom prst="rect">
+              <a:avLst/>
+            </a:prstGeom>
+            <a:noFill/>
+          </p:spPr>
+          <p:txBody>
+            <a:bodyPr wrap="square" rtlCol="0">
+              <a:spAutoFit/>
+            </a:bodyPr>
+            <a:lstStyle/>
+            <a:p>
+              <a:r>
+                <a:rPr lang="fr-FR" b="1" dirty="0"/>
+                <a:t>6</a:t>
+              </a:r>
+            </a:p>
+          </p:txBody>
+        </p:sp>
+        <p:sp>
+          <p:nvSpPr>
+            <p:cNvPr id="20" name="ZoneTexte 19">
+              <a:extLst>
+                <a:ext uri="{FF2B5EF4-FFF2-40B4-BE49-F238E27FC236}">
+                  <a16:creationId xmlns:a16="http://schemas.microsoft.com/office/drawing/2014/main" id="{B7F9B253-7350-B9D3-E3F6-F638FEE26820}"/>
+                </a:ext>
+              </a:extLst>
+            </p:cNvPr>
+            <p:cNvSpPr txBox="1"/>
+            <p:nvPr/>
+          </p:nvSpPr>
+          <p:spPr>
+            <a:xfrm>
+              <a:off x="4900614" y="2043328"/>
+              <a:ext cx="228599" cy="369332"/>
+            </a:xfrm>
+            <a:prstGeom prst="rect">
+              <a:avLst/>
+            </a:prstGeom>
+            <a:noFill/>
+          </p:spPr>
+          <p:txBody>
+            <a:bodyPr wrap="square" rtlCol="0">
+              <a:spAutoFit/>
+            </a:bodyPr>
+            <a:lstStyle/>
+            <a:p>
+              <a:r>
+                <a:rPr lang="fr-FR" b="1" dirty="0"/>
+                <a:t>7</a:t>
+              </a:r>
+            </a:p>
+          </p:txBody>
+        </p:sp>
+        <p:sp>
+          <p:nvSpPr>
+            <p:cNvPr id="2" name="ZoneTexte 1">
+              <a:extLst>
+                <a:ext uri="{FF2B5EF4-FFF2-40B4-BE49-F238E27FC236}">
+                  <a16:creationId xmlns:a16="http://schemas.microsoft.com/office/drawing/2014/main" id="{D3893B69-9B04-FA90-AEFE-AF7724D34F1C}"/>
+                </a:ext>
+              </a:extLst>
+            </p:cNvPr>
+            <p:cNvSpPr txBox="1"/>
+            <p:nvPr/>
+          </p:nvSpPr>
+          <p:spPr>
+            <a:xfrm>
+              <a:off x="857250" y="647700"/>
+              <a:ext cx="3960000" cy="369332"/>
+            </a:xfrm>
+            <a:prstGeom prst="rect">
+              <a:avLst/>
+            </a:prstGeom>
+            <a:noFill/>
+          </p:spPr>
+          <p:txBody>
+            <a:bodyPr wrap="square" rtlCol="0">
+              <a:spAutoFit/>
+            </a:bodyPr>
+            <a:lstStyle/>
+            <a:p>
+              <a:r>
+                <a:rPr lang="fr-FR" dirty="0"/>
+                <a:t>Schéma Atténuateur + phototransistor</a:t>
+              </a:r>
+            </a:p>
+          </p:txBody>
+        </p:sp>
+        <p:sp>
+          <p:nvSpPr>
+            <p:cNvPr id="3" name="ZoneTexte 2">
+              <a:extLst>
+                <a:ext uri="{FF2B5EF4-FFF2-40B4-BE49-F238E27FC236}">
+                  <a16:creationId xmlns:a16="http://schemas.microsoft.com/office/drawing/2014/main" id="{813F41D5-401F-4106-7BE4-5FA0AFFB1899}"/>
+                </a:ext>
+              </a:extLst>
+            </p:cNvPr>
+            <p:cNvSpPr txBox="1"/>
+            <p:nvPr/>
+          </p:nvSpPr>
+          <p:spPr>
+            <a:xfrm>
+              <a:off x="9105900" y="1895475"/>
+              <a:ext cx="2552700" cy="2862322"/>
+            </a:xfrm>
+            <a:prstGeom prst="rect">
+              <a:avLst/>
+            </a:prstGeom>
+            <a:noFill/>
+          </p:spPr>
+          <p:txBody>
+            <a:bodyPr wrap="square" rtlCol="0">
+              <a:spAutoFit/>
+            </a:bodyPr>
+            <a:lstStyle/>
+            <a:p>
+              <a:r>
+                <a:rPr lang="fr-FR" dirty="0"/>
+                <a:t>1- Moteur Att. 1</a:t>
+              </a:r>
+            </a:p>
+            <a:p>
+              <a:r>
+                <a:rPr lang="fr-FR" dirty="0"/>
+                <a:t>2-+5V </a:t>
+              </a:r>
+              <a:r>
+                <a:rPr lang="fr-FR" dirty="0" err="1"/>
+                <a:t>photo-transistor</a:t>
+              </a:r>
+              <a:endParaRPr lang="fr-FR" dirty="0"/>
+            </a:p>
+            <a:p>
+              <a:r>
+                <a:rPr lang="fr-FR" dirty="0"/>
+                <a:t>Avec 100K ohms R et mesure tension //</a:t>
+              </a:r>
+            </a:p>
+            <a:p>
+              <a:r>
+                <a:rPr lang="fr-FR" dirty="0"/>
+                <a:t>3- Moteur Att. 2</a:t>
+              </a:r>
+            </a:p>
+            <a:p>
+              <a:r>
+                <a:rPr lang="fr-FR" dirty="0"/>
+                <a:t>4-+5V phototransistor avec 390 ohms R </a:t>
+              </a:r>
+            </a:p>
+            <a:p>
+              <a:r>
+                <a:rPr lang="fr-FR" dirty="0"/>
+                <a:t>5- Moteur Att. 3</a:t>
+              </a:r>
+            </a:p>
+            <a:p>
+              <a:r>
+                <a:rPr lang="fr-FR" dirty="0"/>
+                <a:t>6- GND transistor </a:t>
+              </a:r>
+            </a:p>
+            <a:p>
+              <a:r>
+                <a:rPr lang="fr-FR" dirty="0"/>
+                <a:t>7-Moteur Att. 4 </a:t>
+              </a:r>
+            </a:p>
+          </p:txBody>
+        </p:sp>
+      </p:grpSp>
     </p:spTree>
     <p:extLst>
       <p:ext uri="{BB962C8B-B14F-4D97-AF65-F5344CB8AC3E}">

</xml_diff>